<commit_message>
Add adaboosting ml draft version, refactoring for ARIMA. add EMA plot
</commit_message>
<xml_diff>
--- a/doc/ds_timeseries_Alifanov.pptx
+++ b/doc/ds_timeseries_Alifanov.pptx
@@ -5,34 +5,37 @@
     <p:sldMasterId id="2147483655" r:id="rId1"/>
   </p:sldMasterIdLst>
   <p:notesMasterIdLst>
-    <p:notesMasterId r:id="rId10"/>
+    <p:notesMasterId r:id="rId13"/>
   </p:notesMasterIdLst>
   <p:sldIdLst>
     <p:sldId id="256" r:id="rId2"/>
     <p:sldId id="262" r:id="rId3"/>
     <p:sldId id="257" r:id="rId4"/>
     <p:sldId id="263" r:id="rId5"/>
-    <p:sldId id="258" r:id="rId6"/>
-    <p:sldId id="259" r:id="rId7"/>
-    <p:sldId id="260" r:id="rId8"/>
-    <p:sldId id="261" r:id="rId9"/>
+    <p:sldId id="264" r:id="rId6"/>
+    <p:sldId id="265" r:id="rId7"/>
+    <p:sldId id="266" r:id="rId8"/>
+    <p:sldId id="258" r:id="rId9"/>
+    <p:sldId id="259" r:id="rId10"/>
+    <p:sldId id="260" r:id="rId11"/>
+    <p:sldId id="261" r:id="rId12"/>
   </p:sldIdLst>
   <p:sldSz cx="9144000" cy="5143500" type="screen16x9"/>
   <p:notesSz cx="6858000" cy="9144000"/>
   <p:embeddedFontLst>
     <p:embeddedFont>
       <p:font typeface="Proxima Nova" panose="020B0604020202020204" charset="0"/>
-      <p:regular r:id="rId11"/>
-      <p:bold r:id="rId12"/>
-      <p:italic r:id="rId13"/>
-      <p:boldItalic r:id="rId14"/>
+      <p:regular r:id="rId14"/>
+      <p:bold r:id="rId15"/>
+      <p:italic r:id="rId16"/>
+      <p:boldItalic r:id="rId17"/>
     </p:embeddedFont>
     <p:embeddedFont>
       <p:font typeface="Ubuntu" panose="020B0604020202020204" charset="0"/>
-      <p:regular r:id="rId15"/>
-      <p:bold r:id="rId16"/>
-      <p:italic r:id="rId17"/>
-      <p:boldItalic r:id="rId18"/>
+      <p:regular r:id="rId18"/>
+      <p:bold r:id="rId19"/>
+      <p:italic r:id="rId20"/>
+      <p:boldItalic r:id="rId21"/>
     </p:embeddedFont>
   </p:embeddedFontLst>
   <p:defaultTextStyle>
@@ -812,6 +815,214 @@
 </p:notes>
 </file>
 
+<file path=ppt/notesSlides/notesSlide10.xml><?xml version="1.0" encoding="utf-8"?>
+<p:notes xmlns:a="http://schemas.openxmlformats.org/drawingml/2006/main" xmlns:r="http://schemas.openxmlformats.org/officeDocument/2006/relationships" xmlns:p="http://schemas.openxmlformats.org/presentationml/2006/main" showMasterSp="0" showMasterPhAnim="0">
+  <p:cSld>
+    <p:spTree>
+      <p:nvGrpSpPr>
+        <p:cNvPr id="1" name="Shape 61"/>
+        <p:cNvGrpSpPr/>
+        <p:nvPr/>
+      </p:nvGrpSpPr>
+      <p:grpSpPr>
+        <a:xfrm>
+          <a:off x="0" y="0"/>
+          <a:ext cx="0" cy="0"/>
+          <a:chOff x="0" y="0"/>
+          <a:chExt cx="0" cy="0"/>
+        </a:xfrm>
+      </p:grpSpPr>
+      <p:sp>
+        <p:nvSpPr>
+          <p:cNvPr id="62" name="Google Shape;62;g79dc1f345_315:notes"/>
+          <p:cNvSpPr>
+            <a:spLocks noGrp="1" noRot="1" noChangeAspect="1"/>
+          </p:cNvSpPr>
+          <p:nvPr>
+            <p:ph type="sldImg" idx="2"/>
+          </p:nvPr>
+        </p:nvSpPr>
+        <p:spPr>
+          <a:xfrm>
+            <a:off x="381188" y="685800"/>
+            <a:ext cx="6096300" cy="3429000"/>
+          </a:xfrm>
+          <a:custGeom>
+            <a:avLst/>
+            <a:gdLst/>
+            <a:ahLst/>
+            <a:cxnLst/>
+            <a:rect l="l" t="t" r="r" b="b"/>
+            <a:pathLst>
+              <a:path w="120000" h="120000" extrusionOk="0">
+                <a:moveTo>
+                  <a:pt x="0" y="0"/>
+                </a:moveTo>
+                <a:lnTo>
+                  <a:pt x="120000" y="0"/>
+                </a:lnTo>
+                <a:lnTo>
+                  <a:pt x="120000" y="120000"/>
+                </a:lnTo>
+                <a:lnTo>
+                  <a:pt x="0" y="120000"/>
+                </a:lnTo>
+                <a:close/>
+              </a:path>
+            </a:pathLst>
+          </a:custGeom>
+        </p:spPr>
+      </p:sp>
+      <p:sp>
+        <p:nvSpPr>
+          <p:cNvPr id="63" name="Google Shape;63;g79dc1f345_315:notes"/>
+          <p:cNvSpPr txBox="1">
+            <a:spLocks noGrp="1"/>
+          </p:cNvSpPr>
+          <p:nvPr>
+            <p:ph type="body" idx="1"/>
+          </p:nvPr>
+        </p:nvSpPr>
+        <p:spPr>
+          <a:xfrm>
+            <a:off x="685800" y="4343400"/>
+            <a:ext cx="5486400" cy="4114800"/>
+          </a:xfrm>
+          <a:prstGeom prst="rect">
+            <a:avLst/>
+          </a:prstGeom>
+        </p:spPr>
+        <p:txBody>
+          <a:bodyPr spcFirstLastPara="1" wrap="square" lIns="91425" tIns="91425" rIns="91425" bIns="91425" anchor="t" anchorCtr="0">
+            <a:noAutofit/>
+          </a:bodyPr>
+          <a:lstStyle/>
+          <a:p>
+            <a:pPr marL="0" lvl="0" indent="0" algn="l" rtl="0">
+              <a:spcBef>
+                <a:spcPts val="0"/>
+              </a:spcBef>
+              <a:spcAft>
+                <a:spcPts val="0"/>
+              </a:spcAft>
+              <a:buNone/>
+            </a:pPr>
+            <a:endParaRPr/>
+          </a:p>
+        </p:txBody>
+      </p:sp>
+    </p:spTree>
+  </p:cSld>
+  <p:clrMapOvr>
+    <a:masterClrMapping/>
+  </p:clrMapOvr>
+</p:notes>
+</file>
+
+<file path=ppt/notesSlides/notesSlide11.xml><?xml version="1.0" encoding="utf-8"?>
+<p:notes xmlns:a="http://schemas.openxmlformats.org/drawingml/2006/main" xmlns:r="http://schemas.openxmlformats.org/officeDocument/2006/relationships" xmlns:p="http://schemas.openxmlformats.org/presentationml/2006/main" showMasterSp="0" showMasterPhAnim="0">
+  <p:cSld>
+    <p:spTree>
+      <p:nvGrpSpPr>
+        <p:cNvPr id="1" name="Shape 68"/>
+        <p:cNvGrpSpPr/>
+        <p:nvPr/>
+      </p:nvGrpSpPr>
+      <p:grpSpPr>
+        <a:xfrm>
+          <a:off x="0" y="0"/>
+          <a:ext cx="0" cy="0"/>
+          <a:chOff x="0" y="0"/>
+          <a:chExt cx="0" cy="0"/>
+        </a:xfrm>
+      </p:grpSpPr>
+      <p:sp>
+        <p:nvSpPr>
+          <p:cNvPr id="69" name="Google Shape;69;g79dc1f345_912:notes"/>
+          <p:cNvSpPr>
+            <a:spLocks noGrp="1" noRot="1" noChangeAspect="1"/>
+          </p:cNvSpPr>
+          <p:nvPr>
+            <p:ph type="sldImg" idx="2"/>
+          </p:nvPr>
+        </p:nvSpPr>
+        <p:spPr>
+          <a:xfrm>
+            <a:off x="381188" y="685800"/>
+            <a:ext cx="6096300" cy="3429000"/>
+          </a:xfrm>
+          <a:custGeom>
+            <a:avLst/>
+            <a:gdLst/>
+            <a:ahLst/>
+            <a:cxnLst/>
+            <a:rect l="l" t="t" r="r" b="b"/>
+            <a:pathLst>
+              <a:path w="120000" h="120000" extrusionOk="0">
+                <a:moveTo>
+                  <a:pt x="0" y="0"/>
+                </a:moveTo>
+                <a:lnTo>
+                  <a:pt x="120000" y="0"/>
+                </a:lnTo>
+                <a:lnTo>
+                  <a:pt x="120000" y="120000"/>
+                </a:lnTo>
+                <a:lnTo>
+                  <a:pt x="0" y="120000"/>
+                </a:lnTo>
+                <a:close/>
+              </a:path>
+            </a:pathLst>
+          </a:custGeom>
+        </p:spPr>
+      </p:sp>
+      <p:sp>
+        <p:nvSpPr>
+          <p:cNvPr id="70" name="Google Shape;70;g79dc1f345_912:notes"/>
+          <p:cNvSpPr txBox="1">
+            <a:spLocks noGrp="1"/>
+          </p:cNvSpPr>
+          <p:nvPr>
+            <p:ph type="body" idx="1"/>
+          </p:nvPr>
+        </p:nvSpPr>
+        <p:spPr>
+          <a:xfrm>
+            <a:off x="685800" y="4343400"/>
+            <a:ext cx="5486400" cy="4114800"/>
+          </a:xfrm>
+          <a:prstGeom prst="rect">
+            <a:avLst/>
+          </a:prstGeom>
+        </p:spPr>
+        <p:txBody>
+          <a:bodyPr spcFirstLastPara="1" wrap="square" lIns="91425" tIns="91425" rIns="91425" bIns="91425" anchor="t" anchorCtr="0">
+            <a:noAutofit/>
+          </a:bodyPr>
+          <a:lstStyle/>
+          <a:p>
+            <a:pPr marL="0" lvl="0" indent="0" algn="l" rtl="0">
+              <a:spcBef>
+                <a:spcPts val="0"/>
+              </a:spcBef>
+              <a:spcAft>
+                <a:spcPts val="0"/>
+              </a:spcAft>
+              <a:buNone/>
+            </a:pPr>
+            <a:endParaRPr/>
+          </a:p>
+        </p:txBody>
+      </p:sp>
+    </p:spTree>
+  </p:cSld>
+  <p:clrMapOvr>
+    <a:masterClrMapping/>
+  </p:clrMapOvr>
+</p:notes>
+</file>
+
 <file path=ppt/notesSlides/notesSlide2.xml><?xml version="1.0" encoding="utf-8"?>
 <p:notes xmlns:a="http://schemas.openxmlformats.org/drawingml/2006/main" xmlns:r="http://schemas.openxmlformats.org/officeDocument/2006/relationships" xmlns:p="http://schemas.openxmlformats.org/presentationml/2006/main" showMasterSp="0" showMasterPhAnim="0">
   <p:cSld>
@@ -1139,6 +1350,333 @@
   <p:cSld>
     <p:spTree>
       <p:nvGrpSpPr>
+        <p:cNvPr id="1" name="Shape 41"/>
+        <p:cNvGrpSpPr/>
+        <p:nvPr/>
+      </p:nvGrpSpPr>
+      <p:grpSpPr>
+        <a:xfrm>
+          <a:off x="0" y="0"/>
+          <a:ext cx="0" cy="0"/>
+          <a:chOff x="0" y="0"/>
+          <a:chExt cx="0" cy="0"/>
+        </a:xfrm>
+      </p:grpSpPr>
+      <p:sp>
+        <p:nvSpPr>
+          <p:cNvPr id="42" name="Google Shape;42;g79dc1f345_30:notes"/>
+          <p:cNvSpPr>
+            <a:spLocks noGrp="1" noRot="1" noChangeAspect="1"/>
+          </p:cNvSpPr>
+          <p:nvPr>
+            <p:ph type="sldImg" idx="2"/>
+          </p:nvPr>
+        </p:nvSpPr>
+        <p:spPr>
+          <a:xfrm>
+            <a:off x="381000" y="685800"/>
+            <a:ext cx="6096000" cy="3429000"/>
+          </a:xfrm>
+          <a:custGeom>
+            <a:avLst/>
+            <a:gdLst/>
+            <a:ahLst/>
+            <a:cxnLst/>
+            <a:rect l="l" t="t" r="r" b="b"/>
+            <a:pathLst>
+              <a:path w="120000" h="120000" extrusionOk="0">
+                <a:moveTo>
+                  <a:pt x="0" y="0"/>
+                </a:moveTo>
+                <a:lnTo>
+                  <a:pt x="120000" y="0"/>
+                </a:lnTo>
+                <a:lnTo>
+                  <a:pt x="120000" y="120000"/>
+                </a:lnTo>
+                <a:lnTo>
+                  <a:pt x="0" y="120000"/>
+                </a:lnTo>
+                <a:close/>
+              </a:path>
+            </a:pathLst>
+          </a:custGeom>
+        </p:spPr>
+      </p:sp>
+      <p:sp>
+        <p:nvSpPr>
+          <p:cNvPr id="43" name="Google Shape;43;g79dc1f345_30:notes"/>
+          <p:cNvSpPr txBox="1">
+            <a:spLocks noGrp="1"/>
+          </p:cNvSpPr>
+          <p:nvPr>
+            <p:ph type="body" idx="1"/>
+          </p:nvPr>
+        </p:nvSpPr>
+        <p:spPr>
+          <a:xfrm>
+            <a:off x="685800" y="4343400"/>
+            <a:ext cx="5486400" cy="4114800"/>
+          </a:xfrm>
+          <a:prstGeom prst="rect">
+            <a:avLst/>
+          </a:prstGeom>
+        </p:spPr>
+        <p:txBody>
+          <a:bodyPr spcFirstLastPara="1" wrap="square" lIns="91425" tIns="91425" rIns="91425" bIns="91425" anchor="t" anchorCtr="0">
+            <a:noAutofit/>
+          </a:bodyPr>
+          <a:lstStyle/>
+          <a:p>
+            <a:pPr marL="0" lvl="0" indent="0" algn="l" rtl="0">
+              <a:spcBef>
+                <a:spcPts val="0"/>
+              </a:spcBef>
+              <a:spcAft>
+                <a:spcPts val="0"/>
+              </a:spcAft>
+              <a:buNone/>
+            </a:pPr>
+            <a:endParaRPr/>
+          </a:p>
+        </p:txBody>
+      </p:sp>
+    </p:spTree>
+    <p:extLst>
+      <p:ext uri="{BB962C8B-B14F-4D97-AF65-F5344CB8AC3E}">
+        <p14:creationId xmlns:p14="http://schemas.microsoft.com/office/powerpoint/2010/main" val="698869545"/>
+      </p:ext>
+    </p:extLst>
+  </p:cSld>
+  <p:clrMapOvr>
+    <a:masterClrMapping/>
+  </p:clrMapOvr>
+</p:notes>
+</file>
+
+<file path=ppt/notesSlides/notesSlide6.xml><?xml version="1.0" encoding="utf-8"?>
+<p:notes xmlns:a="http://schemas.openxmlformats.org/drawingml/2006/main" xmlns:r="http://schemas.openxmlformats.org/officeDocument/2006/relationships" xmlns:p="http://schemas.openxmlformats.org/presentationml/2006/main" showMasterSp="0" showMasterPhAnim="0">
+  <p:cSld>
+    <p:spTree>
+      <p:nvGrpSpPr>
+        <p:cNvPr id="1" name="Shape 41"/>
+        <p:cNvGrpSpPr/>
+        <p:nvPr/>
+      </p:nvGrpSpPr>
+      <p:grpSpPr>
+        <a:xfrm>
+          <a:off x="0" y="0"/>
+          <a:ext cx="0" cy="0"/>
+          <a:chOff x="0" y="0"/>
+          <a:chExt cx="0" cy="0"/>
+        </a:xfrm>
+      </p:grpSpPr>
+      <p:sp>
+        <p:nvSpPr>
+          <p:cNvPr id="42" name="Google Shape;42;g79dc1f345_30:notes"/>
+          <p:cNvSpPr>
+            <a:spLocks noGrp="1" noRot="1" noChangeAspect="1"/>
+          </p:cNvSpPr>
+          <p:nvPr>
+            <p:ph type="sldImg" idx="2"/>
+          </p:nvPr>
+        </p:nvSpPr>
+        <p:spPr>
+          <a:xfrm>
+            <a:off x="381000" y="685800"/>
+            <a:ext cx="6096000" cy="3429000"/>
+          </a:xfrm>
+          <a:custGeom>
+            <a:avLst/>
+            <a:gdLst/>
+            <a:ahLst/>
+            <a:cxnLst/>
+            <a:rect l="l" t="t" r="r" b="b"/>
+            <a:pathLst>
+              <a:path w="120000" h="120000" extrusionOk="0">
+                <a:moveTo>
+                  <a:pt x="0" y="0"/>
+                </a:moveTo>
+                <a:lnTo>
+                  <a:pt x="120000" y="0"/>
+                </a:lnTo>
+                <a:lnTo>
+                  <a:pt x="120000" y="120000"/>
+                </a:lnTo>
+                <a:lnTo>
+                  <a:pt x="0" y="120000"/>
+                </a:lnTo>
+                <a:close/>
+              </a:path>
+            </a:pathLst>
+          </a:custGeom>
+        </p:spPr>
+      </p:sp>
+      <p:sp>
+        <p:nvSpPr>
+          <p:cNvPr id="43" name="Google Shape;43;g79dc1f345_30:notes"/>
+          <p:cNvSpPr txBox="1">
+            <a:spLocks noGrp="1"/>
+          </p:cNvSpPr>
+          <p:nvPr>
+            <p:ph type="body" idx="1"/>
+          </p:nvPr>
+        </p:nvSpPr>
+        <p:spPr>
+          <a:xfrm>
+            <a:off x="685800" y="4343400"/>
+            <a:ext cx="5486400" cy="4114800"/>
+          </a:xfrm>
+          <a:prstGeom prst="rect">
+            <a:avLst/>
+          </a:prstGeom>
+        </p:spPr>
+        <p:txBody>
+          <a:bodyPr spcFirstLastPara="1" wrap="square" lIns="91425" tIns="91425" rIns="91425" bIns="91425" anchor="t" anchorCtr="0">
+            <a:noAutofit/>
+          </a:bodyPr>
+          <a:lstStyle/>
+          <a:p>
+            <a:pPr marL="0" lvl="0" indent="0" algn="l" rtl="0">
+              <a:spcBef>
+                <a:spcPts val="0"/>
+              </a:spcBef>
+              <a:spcAft>
+                <a:spcPts val="0"/>
+              </a:spcAft>
+              <a:buNone/>
+            </a:pPr>
+            <a:endParaRPr/>
+          </a:p>
+        </p:txBody>
+      </p:sp>
+    </p:spTree>
+    <p:extLst>
+      <p:ext uri="{BB962C8B-B14F-4D97-AF65-F5344CB8AC3E}">
+        <p14:creationId xmlns:p14="http://schemas.microsoft.com/office/powerpoint/2010/main" val="3189116315"/>
+      </p:ext>
+    </p:extLst>
+  </p:cSld>
+  <p:clrMapOvr>
+    <a:masterClrMapping/>
+  </p:clrMapOvr>
+</p:notes>
+</file>
+
+<file path=ppt/notesSlides/notesSlide7.xml><?xml version="1.0" encoding="utf-8"?>
+<p:notes xmlns:a="http://schemas.openxmlformats.org/drawingml/2006/main" xmlns:r="http://schemas.openxmlformats.org/officeDocument/2006/relationships" xmlns:p="http://schemas.openxmlformats.org/presentationml/2006/main" showMasterSp="0" showMasterPhAnim="0">
+  <p:cSld>
+    <p:spTree>
+      <p:nvGrpSpPr>
+        <p:cNvPr id="1" name="Shape 41"/>
+        <p:cNvGrpSpPr/>
+        <p:nvPr/>
+      </p:nvGrpSpPr>
+      <p:grpSpPr>
+        <a:xfrm>
+          <a:off x="0" y="0"/>
+          <a:ext cx="0" cy="0"/>
+          <a:chOff x="0" y="0"/>
+          <a:chExt cx="0" cy="0"/>
+        </a:xfrm>
+      </p:grpSpPr>
+      <p:sp>
+        <p:nvSpPr>
+          <p:cNvPr id="42" name="Google Shape;42;g79dc1f345_30:notes"/>
+          <p:cNvSpPr>
+            <a:spLocks noGrp="1" noRot="1" noChangeAspect="1"/>
+          </p:cNvSpPr>
+          <p:nvPr>
+            <p:ph type="sldImg" idx="2"/>
+          </p:nvPr>
+        </p:nvSpPr>
+        <p:spPr>
+          <a:xfrm>
+            <a:off x="381000" y="685800"/>
+            <a:ext cx="6096000" cy="3429000"/>
+          </a:xfrm>
+          <a:custGeom>
+            <a:avLst/>
+            <a:gdLst/>
+            <a:ahLst/>
+            <a:cxnLst/>
+            <a:rect l="l" t="t" r="r" b="b"/>
+            <a:pathLst>
+              <a:path w="120000" h="120000" extrusionOk="0">
+                <a:moveTo>
+                  <a:pt x="0" y="0"/>
+                </a:moveTo>
+                <a:lnTo>
+                  <a:pt x="120000" y="0"/>
+                </a:lnTo>
+                <a:lnTo>
+                  <a:pt x="120000" y="120000"/>
+                </a:lnTo>
+                <a:lnTo>
+                  <a:pt x="0" y="120000"/>
+                </a:lnTo>
+                <a:close/>
+              </a:path>
+            </a:pathLst>
+          </a:custGeom>
+        </p:spPr>
+      </p:sp>
+      <p:sp>
+        <p:nvSpPr>
+          <p:cNvPr id="43" name="Google Shape;43;g79dc1f345_30:notes"/>
+          <p:cNvSpPr txBox="1">
+            <a:spLocks noGrp="1"/>
+          </p:cNvSpPr>
+          <p:nvPr>
+            <p:ph type="body" idx="1"/>
+          </p:nvPr>
+        </p:nvSpPr>
+        <p:spPr>
+          <a:xfrm>
+            <a:off x="685800" y="4343400"/>
+            <a:ext cx="5486400" cy="4114800"/>
+          </a:xfrm>
+          <a:prstGeom prst="rect">
+            <a:avLst/>
+          </a:prstGeom>
+        </p:spPr>
+        <p:txBody>
+          <a:bodyPr spcFirstLastPara="1" wrap="square" lIns="91425" tIns="91425" rIns="91425" bIns="91425" anchor="t" anchorCtr="0">
+            <a:noAutofit/>
+          </a:bodyPr>
+          <a:lstStyle/>
+          <a:p>
+            <a:pPr marL="0" lvl="0" indent="0" algn="l" rtl="0">
+              <a:spcBef>
+                <a:spcPts val="0"/>
+              </a:spcBef>
+              <a:spcAft>
+                <a:spcPts val="0"/>
+              </a:spcAft>
+              <a:buNone/>
+            </a:pPr>
+            <a:endParaRPr/>
+          </a:p>
+        </p:txBody>
+      </p:sp>
+    </p:spTree>
+    <p:extLst>
+      <p:ext uri="{BB962C8B-B14F-4D97-AF65-F5344CB8AC3E}">
+        <p14:creationId xmlns:p14="http://schemas.microsoft.com/office/powerpoint/2010/main" val="2646136935"/>
+      </p:ext>
+    </p:extLst>
+  </p:cSld>
+  <p:clrMapOvr>
+    <a:masterClrMapping/>
+  </p:clrMapOvr>
+</p:notes>
+</file>
+
+<file path=ppt/notesSlides/notesSlide8.xml><?xml version="1.0" encoding="utf-8"?>
+<p:notes xmlns:a="http://schemas.openxmlformats.org/drawingml/2006/main" xmlns:r="http://schemas.openxmlformats.org/officeDocument/2006/relationships" xmlns:p="http://schemas.openxmlformats.org/presentationml/2006/main" showMasterSp="0" showMasterPhAnim="0">
+  <p:cSld>
+    <p:spTree>
+      <p:nvGrpSpPr>
         <p:cNvPr id="1" name="Shape 47"/>
         <p:cNvGrpSpPr/>
         <p:nvPr/>
@@ -1238,7 +1776,7 @@
 </p:notes>
 </file>
 
-<file path=ppt/notesSlides/notesSlide6.xml><?xml version="1.0" encoding="utf-8"?>
+<file path=ppt/notesSlides/notesSlide9.xml><?xml version="1.0" encoding="utf-8"?>
 <p:notes xmlns:a="http://schemas.openxmlformats.org/drawingml/2006/main" xmlns:r="http://schemas.openxmlformats.org/officeDocument/2006/relationships" xmlns:p="http://schemas.openxmlformats.org/presentationml/2006/main" showMasterSp="0" showMasterPhAnim="0">
   <p:cSld>
     <p:spTree>
@@ -1299,214 +1837,6 @@
       <p:sp>
         <p:nvSpPr>
           <p:cNvPr id="56" name="Google Shape;56;g79dc1f345_333:notes"/>
-          <p:cNvSpPr txBox="1">
-            <a:spLocks noGrp="1"/>
-          </p:cNvSpPr>
-          <p:nvPr>
-            <p:ph type="body" idx="1"/>
-          </p:nvPr>
-        </p:nvSpPr>
-        <p:spPr>
-          <a:xfrm>
-            <a:off x="685800" y="4343400"/>
-            <a:ext cx="5486400" cy="4114800"/>
-          </a:xfrm>
-          <a:prstGeom prst="rect">
-            <a:avLst/>
-          </a:prstGeom>
-        </p:spPr>
-        <p:txBody>
-          <a:bodyPr spcFirstLastPara="1" wrap="square" lIns="91425" tIns="91425" rIns="91425" bIns="91425" anchor="t" anchorCtr="0">
-            <a:noAutofit/>
-          </a:bodyPr>
-          <a:lstStyle/>
-          <a:p>
-            <a:pPr marL="0" lvl="0" indent="0" algn="l" rtl="0">
-              <a:spcBef>
-                <a:spcPts val="0"/>
-              </a:spcBef>
-              <a:spcAft>
-                <a:spcPts val="0"/>
-              </a:spcAft>
-              <a:buNone/>
-            </a:pPr>
-            <a:endParaRPr/>
-          </a:p>
-        </p:txBody>
-      </p:sp>
-    </p:spTree>
-  </p:cSld>
-  <p:clrMapOvr>
-    <a:masterClrMapping/>
-  </p:clrMapOvr>
-</p:notes>
-</file>
-
-<file path=ppt/notesSlides/notesSlide7.xml><?xml version="1.0" encoding="utf-8"?>
-<p:notes xmlns:a="http://schemas.openxmlformats.org/drawingml/2006/main" xmlns:r="http://schemas.openxmlformats.org/officeDocument/2006/relationships" xmlns:p="http://schemas.openxmlformats.org/presentationml/2006/main" showMasterSp="0" showMasterPhAnim="0">
-  <p:cSld>
-    <p:spTree>
-      <p:nvGrpSpPr>
-        <p:cNvPr id="1" name="Shape 61"/>
-        <p:cNvGrpSpPr/>
-        <p:nvPr/>
-      </p:nvGrpSpPr>
-      <p:grpSpPr>
-        <a:xfrm>
-          <a:off x="0" y="0"/>
-          <a:ext cx="0" cy="0"/>
-          <a:chOff x="0" y="0"/>
-          <a:chExt cx="0" cy="0"/>
-        </a:xfrm>
-      </p:grpSpPr>
-      <p:sp>
-        <p:nvSpPr>
-          <p:cNvPr id="62" name="Google Shape;62;g79dc1f345_315:notes"/>
-          <p:cNvSpPr>
-            <a:spLocks noGrp="1" noRot="1" noChangeAspect="1"/>
-          </p:cNvSpPr>
-          <p:nvPr>
-            <p:ph type="sldImg" idx="2"/>
-          </p:nvPr>
-        </p:nvSpPr>
-        <p:spPr>
-          <a:xfrm>
-            <a:off x="381188" y="685800"/>
-            <a:ext cx="6096300" cy="3429000"/>
-          </a:xfrm>
-          <a:custGeom>
-            <a:avLst/>
-            <a:gdLst/>
-            <a:ahLst/>
-            <a:cxnLst/>
-            <a:rect l="l" t="t" r="r" b="b"/>
-            <a:pathLst>
-              <a:path w="120000" h="120000" extrusionOk="0">
-                <a:moveTo>
-                  <a:pt x="0" y="0"/>
-                </a:moveTo>
-                <a:lnTo>
-                  <a:pt x="120000" y="0"/>
-                </a:lnTo>
-                <a:lnTo>
-                  <a:pt x="120000" y="120000"/>
-                </a:lnTo>
-                <a:lnTo>
-                  <a:pt x="0" y="120000"/>
-                </a:lnTo>
-                <a:close/>
-              </a:path>
-            </a:pathLst>
-          </a:custGeom>
-        </p:spPr>
-      </p:sp>
-      <p:sp>
-        <p:nvSpPr>
-          <p:cNvPr id="63" name="Google Shape;63;g79dc1f345_315:notes"/>
-          <p:cNvSpPr txBox="1">
-            <a:spLocks noGrp="1"/>
-          </p:cNvSpPr>
-          <p:nvPr>
-            <p:ph type="body" idx="1"/>
-          </p:nvPr>
-        </p:nvSpPr>
-        <p:spPr>
-          <a:xfrm>
-            <a:off x="685800" y="4343400"/>
-            <a:ext cx="5486400" cy="4114800"/>
-          </a:xfrm>
-          <a:prstGeom prst="rect">
-            <a:avLst/>
-          </a:prstGeom>
-        </p:spPr>
-        <p:txBody>
-          <a:bodyPr spcFirstLastPara="1" wrap="square" lIns="91425" tIns="91425" rIns="91425" bIns="91425" anchor="t" anchorCtr="0">
-            <a:noAutofit/>
-          </a:bodyPr>
-          <a:lstStyle/>
-          <a:p>
-            <a:pPr marL="0" lvl="0" indent="0" algn="l" rtl="0">
-              <a:spcBef>
-                <a:spcPts val="0"/>
-              </a:spcBef>
-              <a:spcAft>
-                <a:spcPts val="0"/>
-              </a:spcAft>
-              <a:buNone/>
-            </a:pPr>
-            <a:endParaRPr/>
-          </a:p>
-        </p:txBody>
-      </p:sp>
-    </p:spTree>
-  </p:cSld>
-  <p:clrMapOvr>
-    <a:masterClrMapping/>
-  </p:clrMapOvr>
-</p:notes>
-</file>
-
-<file path=ppt/notesSlides/notesSlide8.xml><?xml version="1.0" encoding="utf-8"?>
-<p:notes xmlns:a="http://schemas.openxmlformats.org/drawingml/2006/main" xmlns:r="http://schemas.openxmlformats.org/officeDocument/2006/relationships" xmlns:p="http://schemas.openxmlformats.org/presentationml/2006/main" showMasterSp="0" showMasterPhAnim="0">
-  <p:cSld>
-    <p:spTree>
-      <p:nvGrpSpPr>
-        <p:cNvPr id="1" name="Shape 68"/>
-        <p:cNvGrpSpPr/>
-        <p:nvPr/>
-      </p:nvGrpSpPr>
-      <p:grpSpPr>
-        <a:xfrm>
-          <a:off x="0" y="0"/>
-          <a:ext cx="0" cy="0"/>
-          <a:chOff x="0" y="0"/>
-          <a:chExt cx="0" cy="0"/>
-        </a:xfrm>
-      </p:grpSpPr>
-      <p:sp>
-        <p:nvSpPr>
-          <p:cNvPr id="69" name="Google Shape;69;g79dc1f345_912:notes"/>
-          <p:cNvSpPr>
-            <a:spLocks noGrp="1" noRot="1" noChangeAspect="1"/>
-          </p:cNvSpPr>
-          <p:nvPr>
-            <p:ph type="sldImg" idx="2"/>
-          </p:nvPr>
-        </p:nvSpPr>
-        <p:spPr>
-          <a:xfrm>
-            <a:off x="381188" y="685800"/>
-            <a:ext cx="6096300" cy="3429000"/>
-          </a:xfrm>
-          <a:custGeom>
-            <a:avLst/>
-            <a:gdLst/>
-            <a:ahLst/>
-            <a:cxnLst/>
-            <a:rect l="l" t="t" r="r" b="b"/>
-            <a:pathLst>
-              <a:path w="120000" h="120000" extrusionOk="0">
-                <a:moveTo>
-                  <a:pt x="0" y="0"/>
-                </a:moveTo>
-                <a:lnTo>
-                  <a:pt x="120000" y="0"/>
-                </a:lnTo>
-                <a:lnTo>
-                  <a:pt x="120000" y="120000"/>
-                </a:lnTo>
-                <a:lnTo>
-                  <a:pt x="0" y="120000"/>
-                </a:lnTo>
-                <a:close/>
-              </a:path>
-            </a:pathLst>
-          </a:custGeom>
-        </p:spPr>
-      </p:sp>
-      <p:sp>
-        <p:nvSpPr>
-          <p:cNvPr id="70" name="Google Shape;70;g79dc1f345_912:notes"/>
           <p:cNvSpPr txBox="1">
             <a:spLocks noGrp="1"/>
           </p:cNvSpPr>
@@ -5712,6 +6042,475 @@
 </p:sld>
 </file>
 
+<file path=ppt/slides/slide10.xml><?xml version="1.0" encoding="utf-8"?>
+<p:sld xmlns:a="http://schemas.openxmlformats.org/drawingml/2006/main" xmlns:r="http://schemas.openxmlformats.org/officeDocument/2006/relationships" xmlns:p="http://schemas.openxmlformats.org/presentationml/2006/main">
+  <p:cSld>
+    <p:spTree>
+      <p:nvGrpSpPr>
+        <p:cNvPr id="1" name="Shape 64"/>
+        <p:cNvGrpSpPr/>
+        <p:nvPr/>
+      </p:nvGrpSpPr>
+      <p:grpSpPr>
+        <a:xfrm>
+          <a:off x="0" y="0"/>
+          <a:ext cx="0" cy="0"/>
+          <a:chOff x="0" y="0"/>
+          <a:chExt cx="0" cy="0"/>
+        </a:xfrm>
+      </p:grpSpPr>
+      <p:pic>
+        <p:nvPicPr>
+          <p:cNvPr id="65" name="Google Shape;65;p13" descr="Watchface-car-opened.png"/>
+          <p:cNvPicPr preferRelativeResize="0"/>
+          <p:nvPr/>
+        </p:nvPicPr>
+        <p:blipFill rotWithShape="1">
+          <a:blip r:embed="rId3">
+            <a:alphaModFix/>
+          </a:blip>
+          <a:srcRect r="62125"/>
+          <a:stretch/>
+        </p:blipFill>
+        <p:spPr>
+          <a:xfrm>
+            <a:off x="-16050" y="0"/>
+            <a:ext cx="3947397" cy="5143525"/>
+          </a:xfrm>
+          <a:prstGeom prst="rect">
+            <a:avLst/>
+          </a:prstGeom>
+          <a:noFill/>
+          <a:ln>
+            <a:noFill/>
+          </a:ln>
+        </p:spPr>
+      </p:pic>
+      <p:sp>
+        <p:nvSpPr>
+          <p:cNvPr id="66" name="Google Shape;66;p13"/>
+          <p:cNvSpPr txBox="1">
+            <a:spLocks noGrp="1"/>
+          </p:cNvSpPr>
+          <p:nvPr>
+            <p:ph type="title"/>
+          </p:nvPr>
+        </p:nvSpPr>
+        <p:spPr>
+          <a:xfrm>
+            <a:off x="4236075" y="211813"/>
+            <a:ext cx="4654800" cy="857400"/>
+          </a:xfrm>
+          <a:prstGeom prst="rect">
+            <a:avLst/>
+          </a:prstGeom>
+        </p:spPr>
+        <p:txBody>
+          <a:bodyPr spcFirstLastPara="1" wrap="square" lIns="91425" tIns="91425" rIns="91425" bIns="91425" anchor="t" anchorCtr="0">
+            <a:noAutofit/>
+          </a:bodyPr>
+          <a:lstStyle/>
+          <a:p>
+            <a:pPr marL="0" lvl="0" indent="0" algn="l" rtl="0">
+              <a:spcBef>
+                <a:spcPts val="0"/>
+              </a:spcBef>
+              <a:spcAft>
+                <a:spcPts val="0"/>
+              </a:spcAft>
+              <a:buNone/>
+            </a:pPr>
+            <a:r>
+              <a:rPr lang="en">
+                <a:solidFill>
+                  <a:srgbClr val="1155CC"/>
+                </a:solidFill>
+                <a:latin typeface="Proxima Nova"/>
+                <a:ea typeface="Proxima Nova"/>
+                <a:cs typeface="Proxima Nova"/>
+                <a:sym typeface="Proxima Nova"/>
+              </a:rPr>
+              <a:t>Image on left</a:t>
+            </a:r>
+            <a:endParaRPr>
+              <a:solidFill>
+                <a:srgbClr val="1155CC"/>
+              </a:solidFill>
+              <a:latin typeface="Proxima Nova"/>
+              <a:ea typeface="Proxima Nova"/>
+              <a:cs typeface="Proxima Nova"/>
+              <a:sym typeface="Proxima Nova"/>
+            </a:endParaRPr>
+          </a:p>
+        </p:txBody>
+      </p:sp>
+      <p:sp>
+        <p:nvSpPr>
+          <p:cNvPr id="67" name="Google Shape;67;p13"/>
+          <p:cNvSpPr txBox="1">
+            <a:spLocks noGrp="1"/>
+          </p:cNvSpPr>
+          <p:nvPr>
+            <p:ph type="body" idx="1"/>
+          </p:nvPr>
+        </p:nvSpPr>
+        <p:spPr>
+          <a:xfrm>
+            <a:off x="4236075" y="1205988"/>
+            <a:ext cx="4056600" cy="3725700"/>
+          </a:xfrm>
+          <a:prstGeom prst="rect">
+            <a:avLst/>
+          </a:prstGeom>
+        </p:spPr>
+        <p:txBody>
+          <a:bodyPr spcFirstLastPara="1" wrap="square" lIns="91425" tIns="91425" rIns="91425" bIns="91425" anchor="t" anchorCtr="0">
+            <a:noAutofit/>
+          </a:bodyPr>
+          <a:lstStyle/>
+          <a:p>
+            <a:pPr marL="0" lvl="0" indent="0" algn="l" rtl="0">
+              <a:spcBef>
+                <a:spcPts val="600"/>
+              </a:spcBef>
+              <a:spcAft>
+                <a:spcPts val="0"/>
+              </a:spcAft>
+              <a:buNone/>
+            </a:pPr>
+            <a:r>
+              <a:rPr lang="en" sz="2400" b="1">
+                <a:latin typeface="Proxima Nova"/>
+                <a:ea typeface="Proxima Nova"/>
+                <a:cs typeface="Proxima Nova"/>
+                <a:sym typeface="Proxima Nova"/>
+              </a:rPr>
+              <a:t>Cool Feature</a:t>
+            </a:r>
+            <a:endParaRPr sz="2400">
+              <a:latin typeface="Proxima Nova"/>
+              <a:ea typeface="Proxima Nova"/>
+              <a:cs typeface="Proxima Nova"/>
+              <a:sym typeface="Proxima Nova"/>
+            </a:endParaRPr>
+          </a:p>
+          <a:p>
+            <a:pPr marL="457200" lvl="0" indent="-381000" algn="l" rtl="0">
+              <a:spcBef>
+                <a:spcPts val="600"/>
+              </a:spcBef>
+              <a:spcAft>
+                <a:spcPts val="0"/>
+              </a:spcAft>
+              <a:buSzPts val="2400"/>
+              <a:buFont typeface="Proxima Nova"/>
+              <a:buChar char="●"/>
+            </a:pPr>
+            <a:r>
+              <a:rPr lang="en" sz="2400">
+                <a:latin typeface="Proxima Nova"/>
+                <a:ea typeface="Proxima Nova"/>
+                <a:cs typeface="Proxima Nova"/>
+                <a:sym typeface="Proxima Nova"/>
+              </a:rPr>
+              <a:t>List Item 1</a:t>
+            </a:r>
+            <a:endParaRPr sz="2400">
+              <a:latin typeface="Proxima Nova"/>
+              <a:ea typeface="Proxima Nova"/>
+              <a:cs typeface="Proxima Nova"/>
+              <a:sym typeface="Proxima Nova"/>
+            </a:endParaRPr>
+          </a:p>
+          <a:p>
+            <a:pPr marL="457200" lvl="0" indent="-381000" algn="l" rtl="0">
+              <a:spcBef>
+                <a:spcPts val="0"/>
+              </a:spcBef>
+              <a:spcAft>
+                <a:spcPts val="0"/>
+              </a:spcAft>
+              <a:buSzPts val="2400"/>
+              <a:buFont typeface="Proxima Nova"/>
+              <a:buChar char="●"/>
+            </a:pPr>
+            <a:r>
+              <a:rPr lang="en" sz="2400">
+                <a:latin typeface="Proxima Nova"/>
+                <a:ea typeface="Proxima Nova"/>
+                <a:cs typeface="Proxima Nova"/>
+                <a:sym typeface="Proxima Nova"/>
+              </a:rPr>
+              <a:t>List Item 2</a:t>
+            </a:r>
+            <a:endParaRPr sz="2400">
+              <a:latin typeface="Proxima Nova"/>
+              <a:ea typeface="Proxima Nova"/>
+              <a:cs typeface="Proxima Nova"/>
+              <a:sym typeface="Proxima Nova"/>
+            </a:endParaRPr>
+          </a:p>
+          <a:p>
+            <a:pPr marL="0" lvl="0" indent="0" algn="l" rtl="0">
+              <a:spcBef>
+                <a:spcPts val="600"/>
+              </a:spcBef>
+              <a:spcAft>
+                <a:spcPts val="0"/>
+              </a:spcAft>
+              <a:buNone/>
+            </a:pPr>
+            <a:r>
+              <a:rPr lang="en" sz="2400" b="1">
+                <a:latin typeface="Proxima Nova"/>
+                <a:ea typeface="Proxima Nova"/>
+                <a:cs typeface="Proxima Nova"/>
+                <a:sym typeface="Proxima Nova"/>
+              </a:rPr>
+              <a:t>One more</a:t>
+            </a:r>
+            <a:endParaRPr sz="2400" b="1">
+              <a:latin typeface="Proxima Nova"/>
+              <a:ea typeface="Proxima Nova"/>
+              <a:cs typeface="Proxima Nova"/>
+              <a:sym typeface="Proxima Nova"/>
+            </a:endParaRPr>
+          </a:p>
+          <a:p>
+            <a:pPr marL="457200" lvl="0" indent="-381000" algn="l" rtl="0">
+              <a:spcBef>
+                <a:spcPts val="600"/>
+              </a:spcBef>
+              <a:spcAft>
+                <a:spcPts val="0"/>
+              </a:spcAft>
+              <a:buSzPts val="2400"/>
+              <a:buFont typeface="Proxima Nova"/>
+              <a:buChar char="●"/>
+            </a:pPr>
+            <a:r>
+              <a:rPr lang="en" sz="2400">
+                <a:latin typeface="Proxima Nova"/>
+                <a:ea typeface="Proxima Nova"/>
+                <a:cs typeface="Proxima Nova"/>
+                <a:sym typeface="Proxima Nova"/>
+              </a:rPr>
+              <a:t>List Item 1</a:t>
+            </a:r>
+            <a:endParaRPr sz="2400">
+              <a:latin typeface="Proxima Nova"/>
+              <a:ea typeface="Proxima Nova"/>
+              <a:cs typeface="Proxima Nova"/>
+              <a:sym typeface="Proxima Nova"/>
+            </a:endParaRPr>
+          </a:p>
+          <a:p>
+            <a:pPr marL="457200" lvl="0" indent="-381000" algn="l" rtl="0">
+              <a:spcBef>
+                <a:spcPts val="0"/>
+              </a:spcBef>
+              <a:spcAft>
+                <a:spcPts val="0"/>
+              </a:spcAft>
+              <a:buSzPts val="2400"/>
+              <a:buFont typeface="Proxima Nova"/>
+              <a:buChar char="●"/>
+            </a:pPr>
+            <a:r>
+              <a:rPr lang="en" sz="2400">
+                <a:latin typeface="Proxima Nova"/>
+                <a:ea typeface="Proxima Nova"/>
+                <a:cs typeface="Proxima Nova"/>
+                <a:sym typeface="Proxima Nova"/>
+              </a:rPr>
+              <a:t>List Item 2</a:t>
+            </a:r>
+            <a:endParaRPr sz="2400">
+              <a:latin typeface="Proxima Nova"/>
+              <a:ea typeface="Proxima Nova"/>
+              <a:cs typeface="Proxima Nova"/>
+              <a:sym typeface="Proxima Nova"/>
+            </a:endParaRPr>
+          </a:p>
+        </p:txBody>
+      </p:sp>
+    </p:spTree>
+  </p:cSld>
+  <p:clrMapOvr>
+    <a:masterClrMapping/>
+  </p:clrMapOvr>
+</p:sld>
+</file>
+
+<file path=ppt/slides/slide11.xml><?xml version="1.0" encoding="utf-8"?>
+<p:sld xmlns:a="http://schemas.openxmlformats.org/drawingml/2006/main" xmlns:r="http://schemas.openxmlformats.org/officeDocument/2006/relationships" xmlns:p="http://schemas.openxmlformats.org/presentationml/2006/main">
+  <p:cSld>
+    <p:bg>
+      <p:bgPr>
+        <a:solidFill>
+          <a:srgbClr val="1155CC"/>
+        </a:solidFill>
+        <a:effectLst/>
+      </p:bgPr>
+    </p:bg>
+    <p:spTree>
+      <p:nvGrpSpPr>
+        <p:cNvPr id="1" name="Shape 71"/>
+        <p:cNvGrpSpPr/>
+        <p:nvPr/>
+      </p:nvGrpSpPr>
+      <p:grpSpPr>
+        <a:xfrm>
+          <a:off x="0" y="0"/>
+          <a:ext cx="0" cy="0"/>
+          <a:chOff x="0" y="0"/>
+          <a:chExt cx="0" cy="0"/>
+        </a:xfrm>
+      </p:grpSpPr>
+      <p:sp>
+        <p:nvSpPr>
+          <p:cNvPr id="72" name="Google Shape;72;p14"/>
+          <p:cNvSpPr txBox="1">
+            <a:spLocks noGrp="1"/>
+          </p:cNvSpPr>
+          <p:nvPr>
+            <p:ph type="ctrTitle"/>
+          </p:nvPr>
+        </p:nvSpPr>
+        <p:spPr>
+          <a:xfrm>
+            <a:off x="685800" y="1583342"/>
+            <a:ext cx="7772400" cy="1159800"/>
+          </a:xfrm>
+          <a:prstGeom prst="rect">
+            <a:avLst/>
+          </a:prstGeom>
+        </p:spPr>
+        <p:txBody>
+          <a:bodyPr spcFirstLastPara="1" wrap="square" lIns="91425" tIns="91425" rIns="91425" bIns="91425" anchor="b" anchorCtr="0">
+            <a:noAutofit/>
+          </a:bodyPr>
+          <a:lstStyle/>
+          <a:p>
+            <a:pPr marL="0" lvl="0" indent="0" algn="l" rtl="0">
+              <a:spcBef>
+                <a:spcPts val="0"/>
+              </a:spcBef>
+              <a:spcAft>
+                <a:spcPts val="0"/>
+              </a:spcAft>
+              <a:buNone/>
+            </a:pPr>
+            <a:r>
+              <a:rPr lang="en">
+                <a:solidFill>
+                  <a:schemeClr val="lt1"/>
+                </a:solidFill>
+              </a:rPr>
+              <a:t>Inspired by Technology.</a:t>
+            </a:r>
+            <a:endParaRPr>
+              <a:solidFill>
+                <a:schemeClr val="lt1"/>
+              </a:solidFill>
+            </a:endParaRPr>
+          </a:p>
+          <a:p>
+            <a:pPr marL="0" lvl="0" indent="0" algn="l" rtl="0">
+              <a:spcBef>
+                <a:spcPts val="0"/>
+              </a:spcBef>
+              <a:spcAft>
+                <a:spcPts val="0"/>
+              </a:spcAft>
+              <a:buNone/>
+            </a:pPr>
+            <a:r>
+              <a:rPr lang="en">
+                <a:solidFill>
+                  <a:schemeClr val="lt1"/>
+                </a:solidFill>
+              </a:rPr>
+              <a:t>Driven by Value.</a:t>
+            </a:r>
+            <a:endParaRPr/>
+          </a:p>
+        </p:txBody>
+      </p:sp>
+      <p:sp>
+        <p:nvSpPr>
+          <p:cNvPr id="73" name="Google Shape;73;p14"/>
+          <p:cNvSpPr txBox="1">
+            <a:spLocks noGrp="1"/>
+          </p:cNvSpPr>
+          <p:nvPr>
+            <p:ph type="subTitle" idx="1"/>
+          </p:nvPr>
+        </p:nvSpPr>
+        <p:spPr>
+          <a:xfrm>
+            <a:off x="685800" y="2611454"/>
+            <a:ext cx="7772400" cy="784800"/>
+          </a:xfrm>
+          <a:prstGeom prst="rect">
+            <a:avLst/>
+          </a:prstGeom>
+        </p:spPr>
+        <p:txBody>
+          <a:bodyPr spcFirstLastPara="1" wrap="square" lIns="91425" tIns="91425" rIns="91425" bIns="91425" anchor="t" anchorCtr="0">
+            <a:noAutofit/>
+          </a:bodyPr>
+          <a:lstStyle/>
+          <a:p>
+            <a:pPr marL="0" lvl="0" indent="0" algn="l" rtl="0">
+              <a:spcBef>
+                <a:spcPts val="0"/>
+              </a:spcBef>
+              <a:spcAft>
+                <a:spcPts val="0"/>
+              </a:spcAft>
+              <a:buNone/>
+            </a:pPr>
+            <a:endParaRPr/>
+          </a:p>
+        </p:txBody>
+      </p:sp>
+      <p:pic>
+        <p:nvPicPr>
+          <p:cNvPr id="74" name="Google Shape;74;p14"/>
+          <p:cNvPicPr preferRelativeResize="0"/>
+          <p:nvPr/>
+        </p:nvPicPr>
+        <p:blipFill>
+          <a:blip r:embed="rId3">
+            <a:alphaModFix/>
+          </a:blip>
+          <a:stretch>
+            <a:fillRect/>
+          </a:stretch>
+        </p:blipFill>
+        <p:spPr>
+          <a:xfrm>
+            <a:off x="880225" y="676625"/>
+            <a:ext cx="828905" cy="227400"/>
+          </a:xfrm>
+          <a:prstGeom prst="rect">
+            <a:avLst/>
+          </a:prstGeom>
+          <a:noFill/>
+          <a:ln>
+            <a:noFill/>
+          </a:ln>
+        </p:spPr>
+      </p:pic>
+    </p:spTree>
+  </p:cSld>
+  <p:clrMapOvr>
+    <a:masterClrMapping/>
+  </p:clrMapOvr>
+</p:sld>
+</file>
+
 <file path=ppt/slides/slide2.xml><?xml version="1.0" encoding="utf-8"?>
 <p:sld xmlns:a="http://schemas.openxmlformats.org/drawingml/2006/main" xmlns:r="http://schemas.openxmlformats.org/officeDocument/2006/relationships" xmlns:p="http://schemas.openxmlformats.org/presentationml/2006/main">
   <p:cSld>
@@ -6920,6 +7719,352 @@
         </p:nvSpPr>
         <p:spPr>
           <a:xfrm>
+            <a:off x="457200" y="249279"/>
+            <a:ext cx="8229600" cy="737189"/>
+          </a:xfrm>
+          <a:prstGeom prst="rect">
+            <a:avLst/>
+          </a:prstGeom>
+        </p:spPr>
+        <p:txBody>
+          <a:bodyPr spcFirstLastPara="1" wrap="square" lIns="91425" tIns="91425" rIns="91425" bIns="91425" anchor="t" anchorCtr="0">
+            <a:noAutofit/>
+          </a:bodyPr>
+          <a:lstStyle/>
+          <a:p>
+            <a:pPr marL="0" lvl="0" indent="0" algn="l" rtl="0">
+              <a:spcBef>
+                <a:spcPts val="0"/>
+              </a:spcBef>
+              <a:spcAft>
+                <a:spcPts val="0"/>
+              </a:spcAft>
+              <a:buNone/>
+            </a:pPr>
+            <a:r>
+              <a:rPr lang="en-US" dirty="0"/>
+              <a:t>Regions production</a:t>
+            </a:r>
+            <a:endParaRPr dirty="0">
+              <a:solidFill>
+                <a:srgbClr val="1155CC"/>
+              </a:solidFill>
+              <a:latin typeface="Proxima Nova"/>
+              <a:ea typeface="Proxima Nova"/>
+              <a:cs typeface="Proxima Nova"/>
+              <a:sym typeface="Proxima Nova"/>
+            </a:endParaRPr>
+          </a:p>
+        </p:txBody>
+      </p:sp>
+      <p:pic>
+        <p:nvPicPr>
+          <p:cNvPr id="2" name="Picture 1">
+            <a:extLst>
+              <a:ext uri="{FF2B5EF4-FFF2-40B4-BE49-F238E27FC236}">
+                <a16:creationId xmlns:a16="http://schemas.microsoft.com/office/drawing/2014/main" id="{9A973AEE-31F2-4886-A407-A80F036D2D27}"/>
+              </a:ext>
+            </a:extLst>
+          </p:cNvPr>
+          <p:cNvPicPr>
+            <a:picLocks noChangeAspect="1"/>
+          </p:cNvPicPr>
+          <p:nvPr/>
+        </p:nvPicPr>
+        <p:blipFill>
+          <a:blip r:embed="rId3"/>
+          <a:stretch>
+            <a:fillRect/>
+          </a:stretch>
+        </p:blipFill>
+        <p:spPr>
+          <a:xfrm>
+            <a:off x="0" y="893135"/>
+            <a:ext cx="9144000" cy="4001086"/>
+          </a:xfrm>
+          <a:prstGeom prst="rect">
+            <a:avLst/>
+          </a:prstGeom>
+        </p:spPr>
+      </p:pic>
+    </p:spTree>
+    <p:extLst>
+      <p:ext uri="{BB962C8B-B14F-4D97-AF65-F5344CB8AC3E}">
+        <p14:creationId xmlns:p14="http://schemas.microsoft.com/office/powerpoint/2010/main" val="755639322"/>
+      </p:ext>
+    </p:extLst>
+  </p:cSld>
+  <p:clrMapOvr>
+    <a:masterClrMapping/>
+  </p:clrMapOvr>
+</p:sld>
+</file>
+
+<file path=ppt/slides/slide5.xml><?xml version="1.0" encoding="utf-8"?>
+<p:sld xmlns:a="http://schemas.openxmlformats.org/drawingml/2006/main" xmlns:r="http://schemas.openxmlformats.org/officeDocument/2006/relationships" xmlns:p="http://schemas.openxmlformats.org/presentationml/2006/main">
+  <p:cSld>
+    <p:spTree>
+      <p:nvGrpSpPr>
+        <p:cNvPr id="1" name="Shape 44"/>
+        <p:cNvGrpSpPr/>
+        <p:nvPr/>
+      </p:nvGrpSpPr>
+      <p:grpSpPr>
+        <a:xfrm>
+          <a:off x="0" y="0"/>
+          <a:ext cx="0" cy="0"/>
+          <a:chOff x="0" y="0"/>
+          <a:chExt cx="0" cy="0"/>
+        </a:xfrm>
+      </p:grpSpPr>
+      <p:sp>
+        <p:nvSpPr>
+          <p:cNvPr id="45" name="Google Shape;45;p10"/>
+          <p:cNvSpPr txBox="1">
+            <a:spLocks noGrp="1"/>
+          </p:cNvSpPr>
+          <p:nvPr>
+            <p:ph type="title"/>
+          </p:nvPr>
+        </p:nvSpPr>
+        <p:spPr>
+          <a:xfrm>
+            <a:off x="457200" y="358378"/>
+            <a:ext cx="8229600" cy="591464"/>
+          </a:xfrm>
+          <a:prstGeom prst="rect">
+            <a:avLst/>
+          </a:prstGeom>
+        </p:spPr>
+        <p:txBody>
+          <a:bodyPr spcFirstLastPara="1" wrap="square" lIns="91425" tIns="91425" rIns="91425" bIns="91425" anchor="t" anchorCtr="0">
+            <a:noAutofit/>
+          </a:bodyPr>
+          <a:lstStyle/>
+          <a:p>
+            <a:pPr marL="0" lvl="0" indent="0" algn="l" rtl="0">
+              <a:spcBef>
+                <a:spcPts val="0"/>
+              </a:spcBef>
+              <a:spcAft>
+                <a:spcPts val="0"/>
+              </a:spcAft>
+              <a:buNone/>
+            </a:pPr>
+            <a:r>
+              <a:rPr lang="en-US" dirty="0">
+                <a:solidFill>
+                  <a:srgbClr val="1155CC"/>
+                </a:solidFill>
+                <a:latin typeface="Proxima Nova"/>
+                <a:ea typeface="Proxima Nova"/>
+                <a:cs typeface="Proxima Nova"/>
+                <a:sym typeface="Proxima Nova"/>
+              </a:rPr>
+              <a:t>Planted area</a:t>
+            </a:r>
+            <a:endParaRPr dirty="0">
+              <a:solidFill>
+                <a:srgbClr val="1155CC"/>
+              </a:solidFill>
+              <a:latin typeface="Proxima Nova"/>
+              <a:ea typeface="Proxima Nova"/>
+              <a:cs typeface="Proxima Nova"/>
+              <a:sym typeface="Proxima Nova"/>
+            </a:endParaRPr>
+          </a:p>
+        </p:txBody>
+      </p:sp>
+      <p:pic>
+        <p:nvPicPr>
+          <p:cNvPr id="4" name="Picture 3">
+            <a:extLst>
+              <a:ext uri="{FF2B5EF4-FFF2-40B4-BE49-F238E27FC236}">
+                <a16:creationId xmlns:a16="http://schemas.microsoft.com/office/drawing/2014/main" id="{80DEBDF4-9CB2-4F6D-8130-1E734AB81633}"/>
+              </a:ext>
+            </a:extLst>
+          </p:cNvPr>
+          <p:cNvPicPr>
+            <a:picLocks noChangeAspect="1"/>
+          </p:cNvPicPr>
+          <p:nvPr/>
+        </p:nvPicPr>
+        <p:blipFill>
+          <a:blip r:embed="rId3"/>
+          <a:stretch>
+            <a:fillRect/>
+          </a:stretch>
+        </p:blipFill>
+        <p:spPr>
+          <a:xfrm>
+            <a:off x="109870" y="949842"/>
+            <a:ext cx="8924260" cy="3895933"/>
+          </a:xfrm>
+          <a:prstGeom prst="rect">
+            <a:avLst/>
+          </a:prstGeom>
+        </p:spPr>
+      </p:pic>
+    </p:spTree>
+    <p:extLst>
+      <p:ext uri="{BB962C8B-B14F-4D97-AF65-F5344CB8AC3E}">
+        <p14:creationId xmlns:p14="http://schemas.microsoft.com/office/powerpoint/2010/main" val="1428756972"/>
+      </p:ext>
+    </p:extLst>
+  </p:cSld>
+  <p:clrMapOvr>
+    <a:masterClrMapping/>
+  </p:clrMapOvr>
+</p:sld>
+</file>
+
+<file path=ppt/slides/slide6.xml><?xml version="1.0" encoding="utf-8"?>
+<p:sld xmlns:a="http://schemas.openxmlformats.org/drawingml/2006/main" xmlns:r="http://schemas.openxmlformats.org/officeDocument/2006/relationships" xmlns:p="http://schemas.openxmlformats.org/presentationml/2006/main">
+  <p:cSld>
+    <p:spTree>
+      <p:nvGrpSpPr>
+        <p:cNvPr id="1" name="Shape 44"/>
+        <p:cNvGrpSpPr/>
+        <p:nvPr/>
+      </p:nvGrpSpPr>
+      <p:grpSpPr>
+        <a:xfrm>
+          <a:off x="0" y="0"/>
+          <a:ext cx="0" cy="0"/>
+          <a:chOff x="0" y="0"/>
+          <a:chExt cx="0" cy="0"/>
+        </a:xfrm>
+      </p:grpSpPr>
+      <p:sp>
+        <p:nvSpPr>
+          <p:cNvPr id="45" name="Google Shape;45;p10"/>
+          <p:cNvSpPr txBox="1">
+            <a:spLocks noGrp="1"/>
+          </p:cNvSpPr>
+          <p:nvPr>
+            <p:ph type="title"/>
+          </p:nvPr>
+        </p:nvSpPr>
+        <p:spPr>
+          <a:xfrm>
+            <a:off x="457200" y="358378"/>
+            <a:ext cx="8229600" cy="612729"/>
+          </a:xfrm>
+          <a:prstGeom prst="rect">
+            <a:avLst/>
+          </a:prstGeom>
+        </p:spPr>
+        <p:txBody>
+          <a:bodyPr spcFirstLastPara="1" wrap="square" lIns="91425" tIns="91425" rIns="91425" bIns="91425" anchor="t" anchorCtr="0">
+            <a:noAutofit/>
+          </a:bodyPr>
+          <a:lstStyle/>
+          <a:p>
+            <a:pPr marL="0" lvl="0" indent="0" algn="l" rtl="0">
+              <a:spcBef>
+                <a:spcPts val="0"/>
+              </a:spcBef>
+              <a:spcAft>
+                <a:spcPts val="0"/>
+              </a:spcAft>
+              <a:buNone/>
+            </a:pPr>
+            <a:r>
+              <a:rPr lang="en-US" dirty="0">
+                <a:solidFill>
+                  <a:srgbClr val="1155CC"/>
+                </a:solidFill>
+                <a:latin typeface="Proxima Nova"/>
+                <a:ea typeface="Proxima Nova"/>
+                <a:cs typeface="Proxima Nova"/>
+                <a:sym typeface="Proxima Nova"/>
+              </a:rPr>
+              <a:t>Rainfalls</a:t>
+            </a:r>
+            <a:endParaRPr dirty="0">
+              <a:solidFill>
+                <a:srgbClr val="1155CC"/>
+              </a:solidFill>
+              <a:latin typeface="Proxima Nova"/>
+              <a:ea typeface="Proxima Nova"/>
+              <a:cs typeface="Proxima Nova"/>
+              <a:sym typeface="Proxima Nova"/>
+            </a:endParaRPr>
+          </a:p>
+        </p:txBody>
+      </p:sp>
+      <p:pic>
+        <p:nvPicPr>
+          <p:cNvPr id="4" name="Picture 3">
+            <a:extLst>
+              <a:ext uri="{FF2B5EF4-FFF2-40B4-BE49-F238E27FC236}">
+                <a16:creationId xmlns:a16="http://schemas.microsoft.com/office/drawing/2014/main" id="{E1DA3BE7-0135-4623-AA3C-E635D4B9C843}"/>
+              </a:ext>
+            </a:extLst>
+          </p:cNvPr>
+          <p:cNvPicPr>
+            <a:picLocks noChangeAspect="1"/>
+          </p:cNvPicPr>
+          <p:nvPr/>
+        </p:nvPicPr>
+        <p:blipFill>
+          <a:blip r:embed="rId3"/>
+          <a:stretch>
+            <a:fillRect/>
+          </a:stretch>
+        </p:blipFill>
+        <p:spPr>
+          <a:xfrm>
+            <a:off x="0" y="921488"/>
+            <a:ext cx="9144000" cy="4013482"/>
+          </a:xfrm>
+          <a:prstGeom prst="rect">
+            <a:avLst/>
+          </a:prstGeom>
+        </p:spPr>
+      </p:pic>
+    </p:spTree>
+    <p:extLst>
+      <p:ext uri="{BB962C8B-B14F-4D97-AF65-F5344CB8AC3E}">
+        <p14:creationId xmlns:p14="http://schemas.microsoft.com/office/powerpoint/2010/main" val="2465871789"/>
+      </p:ext>
+    </p:extLst>
+  </p:cSld>
+  <p:clrMapOvr>
+    <a:masterClrMapping/>
+  </p:clrMapOvr>
+</p:sld>
+</file>
+
+<file path=ppt/slides/slide7.xml><?xml version="1.0" encoding="utf-8"?>
+<p:sld xmlns:a="http://schemas.openxmlformats.org/drawingml/2006/main" xmlns:r="http://schemas.openxmlformats.org/officeDocument/2006/relationships" xmlns:p="http://schemas.openxmlformats.org/presentationml/2006/main">
+  <p:cSld>
+    <p:spTree>
+      <p:nvGrpSpPr>
+        <p:cNvPr id="1" name="Shape 44"/>
+        <p:cNvGrpSpPr/>
+        <p:nvPr/>
+      </p:nvGrpSpPr>
+      <p:grpSpPr>
+        <a:xfrm>
+          <a:off x="0" y="0"/>
+          <a:ext cx="0" cy="0"/>
+          <a:chOff x="0" y="0"/>
+          <a:chExt cx="0" cy="0"/>
+        </a:xfrm>
+      </p:grpSpPr>
+      <p:sp>
+        <p:nvSpPr>
+          <p:cNvPr id="45" name="Google Shape;45;p10"/>
+          <p:cNvSpPr txBox="1">
+            <a:spLocks noGrp="1"/>
+          </p:cNvSpPr>
+          <p:nvPr>
+            <p:ph type="title"/>
+          </p:nvPr>
+        </p:nvSpPr>
+        <p:spPr>
+          <a:xfrm>
             <a:off x="457200" y="358378"/>
             <a:ext cx="8229600" cy="857400"/>
           </a:xfrm>
@@ -7043,7 +8188,7 @@
     </p:spTree>
     <p:extLst>
       <p:ext uri="{BB962C8B-B14F-4D97-AF65-F5344CB8AC3E}">
-        <p14:creationId xmlns:p14="http://schemas.microsoft.com/office/powerpoint/2010/main" val="755639322"/>
+        <p14:creationId xmlns:p14="http://schemas.microsoft.com/office/powerpoint/2010/main" val="3822690145"/>
       </p:ext>
     </p:extLst>
   </p:cSld>
@@ -7053,7 +8198,7 @@
 </p:sld>
 </file>
 
-<file path=ppt/slides/slide5.xml><?xml version="1.0" encoding="utf-8"?>
+<file path=ppt/slides/slide8.xml><?xml version="1.0" encoding="utf-8"?>
 <p:sld xmlns:a="http://schemas.openxmlformats.org/drawingml/2006/main" xmlns:r="http://schemas.openxmlformats.org/officeDocument/2006/relationships" xmlns:p="http://schemas.openxmlformats.org/presentationml/2006/main">
   <p:cSld>
     <p:bg>
@@ -7413,7 +8558,7 @@
 </p:sld>
 </file>
 
-<file path=ppt/slides/slide6.xml><?xml version="1.0" encoding="utf-8"?>
+<file path=ppt/slides/slide9.xml><?xml version="1.0" encoding="utf-8"?>
 <p:sld xmlns:a="http://schemas.openxmlformats.org/drawingml/2006/main" xmlns:r="http://schemas.openxmlformats.org/officeDocument/2006/relationships" xmlns:p="http://schemas.openxmlformats.org/presentationml/2006/main">
   <p:cSld>
     <p:bg>
@@ -7656,475 +8801,6 @@
           </a:p>
         </p:txBody>
       </p:sp>
-    </p:spTree>
-  </p:cSld>
-  <p:clrMapOvr>
-    <a:masterClrMapping/>
-  </p:clrMapOvr>
-</p:sld>
-</file>
-
-<file path=ppt/slides/slide7.xml><?xml version="1.0" encoding="utf-8"?>
-<p:sld xmlns:a="http://schemas.openxmlformats.org/drawingml/2006/main" xmlns:r="http://schemas.openxmlformats.org/officeDocument/2006/relationships" xmlns:p="http://schemas.openxmlformats.org/presentationml/2006/main">
-  <p:cSld>
-    <p:spTree>
-      <p:nvGrpSpPr>
-        <p:cNvPr id="1" name="Shape 64"/>
-        <p:cNvGrpSpPr/>
-        <p:nvPr/>
-      </p:nvGrpSpPr>
-      <p:grpSpPr>
-        <a:xfrm>
-          <a:off x="0" y="0"/>
-          <a:ext cx="0" cy="0"/>
-          <a:chOff x="0" y="0"/>
-          <a:chExt cx="0" cy="0"/>
-        </a:xfrm>
-      </p:grpSpPr>
-      <p:pic>
-        <p:nvPicPr>
-          <p:cNvPr id="65" name="Google Shape;65;p13" descr="Watchface-car-opened.png"/>
-          <p:cNvPicPr preferRelativeResize="0"/>
-          <p:nvPr/>
-        </p:nvPicPr>
-        <p:blipFill rotWithShape="1">
-          <a:blip r:embed="rId3">
-            <a:alphaModFix/>
-          </a:blip>
-          <a:srcRect r="62125"/>
-          <a:stretch/>
-        </p:blipFill>
-        <p:spPr>
-          <a:xfrm>
-            <a:off x="-16050" y="0"/>
-            <a:ext cx="3947397" cy="5143525"/>
-          </a:xfrm>
-          <a:prstGeom prst="rect">
-            <a:avLst/>
-          </a:prstGeom>
-          <a:noFill/>
-          <a:ln>
-            <a:noFill/>
-          </a:ln>
-        </p:spPr>
-      </p:pic>
-      <p:sp>
-        <p:nvSpPr>
-          <p:cNvPr id="66" name="Google Shape;66;p13"/>
-          <p:cNvSpPr txBox="1">
-            <a:spLocks noGrp="1"/>
-          </p:cNvSpPr>
-          <p:nvPr>
-            <p:ph type="title"/>
-          </p:nvPr>
-        </p:nvSpPr>
-        <p:spPr>
-          <a:xfrm>
-            <a:off x="4236075" y="211813"/>
-            <a:ext cx="4654800" cy="857400"/>
-          </a:xfrm>
-          <a:prstGeom prst="rect">
-            <a:avLst/>
-          </a:prstGeom>
-        </p:spPr>
-        <p:txBody>
-          <a:bodyPr spcFirstLastPara="1" wrap="square" lIns="91425" tIns="91425" rIns="91425" bIns="91425" anchor="t" anchorCtr="0">
-            <a:noAutofit/>
-          </a:bodyPr>
-          <a:lstStyle/>
-          <a:p>
-            <a:pPr marL="0" lvl="0" indent="0" algn="l" rtl="0">
-              <a:spcBef>
-                <a:spcPts val="0"/>
-              </a:spcBef>
-              <a:spcAft>
-                <a:spcPts val="0"/>
-              </a:spcAft>
-              <a:buNone/>
-            </a:pPr>
-            <a:r>
-              <a:rPr lang="en">
-                <a:solidFill>
-                  <a:srgbClr val="1155CC"/>
-                </a:solidFill>
-                <a:latin typeface="Proxima Nova"/>
-                <a:ea typeface="Proxima Nova"/>
-                <a:cs typeface="Proxima Nova"/>
-                <a:sym typeface="Proxima Nova"/>
-              </a:rPr>
-              <a:t>Image on left</a:t>
-            </a:r>
-            <a:endParaRPr>
-              <a:solidFill>
-                <a:srgbClr val="1155CC"/>
-              </a:solidFill>
-              <a:latin typeface="Proxima Nova"/>
-              <a:ea typeface="Proxima Nova"/>
-              <a:cs typeface="Proxima Nova"/>
-              <a:sym typeface="Proxima Nova"/>
-            </a:endParaRPr>
-          </a:p>
-        </p:txBody>
-      </p:sp>
-      <p:sp>
-        <p:nvSpPr>
-          <p:cNvPr id="67" name="Google Shape;67;p13"/>
-          <p:cNvSpPr txBox="1">
-            <a:spLocks noGrp="1"/>
-          </p:cNvSpPr>
-          <p:nvPr>
-            <p:ph type="body" idx="1"/>
-          </p:nvPr>
-        </p:nvSpPr>
-        <p:spPr>
-          <a:xfrm>
-            <a:off x="4236075" y="1205988"/>
-            <a:ext cx="4056600" cy="3725700"/>
-          </a:xfrm>
-          <a:prstGeom prst="rect">
-            <a:avLst/>
-          </a:prstGeom>
-        </p:spPr>
-        <p:txBody>
-          <a:bodyPr spcFirstLastPara="1" wrap="square" lIns="91425" tIns="91425" rIns="91425" bIns="91425" anchor="t" anchorCtr="0">
-            <a:noAutofit/>
-          </a:bodyPr>
-          <a:lstStyle/>
-          <a:p>
-            <a:pPr marL="0" lvl="0" indent="0" algn="l" rtl="0">
-              <a:spcBef>
-                <a:spcPts val="600"/>
-              </a:spcBef>
-              <a:spcAft>
-                <a:spcPts val="0"/>
-              </a:spcAft>
-              <a:buNone/>
-            </a:pPr>
-            <a:r>
-              <a:rPr lang="en" sz="2400" b="1">
-                <a:latin typeface="Proxima Nova"/>
-                <a:ea typeface="Proxima Nova"/>
-                <a:cs typeface="Proxima Nova"/>
-                <a:sym typeface="Proxima Nova"/>
-              </a:rPr>
-              <a:t>Cool Feature</a:t>
-            </a:r>
-            <a:endParaRPr sz="2400">
-              <a:latin typeface="Proxima Nova"/>
-              <a:ea typeface="Proxima Nova"/>
-              <a:cs typeface="Proxima Nova"/>
-              <a:sym typeface="Proxima Nova"/>
-            </a:endParaRPr>
-          </a:p>
-          <a:p>
-            <a:pPr marL="457200" lvl="0" indent="-381000" algn="l" rtl="0">
-              <a:spcBef>
-                <a:spcPts val="600"/>
-              </a:spcBef>
-              <a:spcAft>
-                <a:spcPts val="0"/>
-              </a:spcAft>
-              <a:buSzPts val="2400"/>
-              <a:buFont typeface="Proxima Nova"/>
-              <a:buChar char="●"/>
-            </a:pPr>
-            <a:r>
-              <a:rPr lang="en" sz="2400">
-                <a:latin typeface="Proxima Nova"/>
-                <a:ea typeface="Proxima Nova"/>
-                <a:cs typeface="Proxima Nova"/>
-                <a:sym typeface="Proxima Nova"/>
-              </a:rPr>
-              <a:t>List Item 1</a:t>
-            </a:r>
-            <a:endParaRPr sz="2400">
-              <a:latin typeface="Proxima Nova"/>
-              <a:ea typeface="Proxima Nova"/>
-              <a:cs typeface="Proxima Nova"/>
-              <a:sym typeface="Proxima Nova"/>
-            </a:endParaRPr>
-          </a:p>
-          <a:p>
-            <a:pPr marL="457200" lvl="0" indent="-381000" algn="l" rtl="0">
-              <a:spcBef>
-                <a:spcPts val="0"/>
-              </a:spcBef>
-              <a:spcAft>
-                <a:spcPts val="0"/>
-              </a:spcAft>
-              <a:buSzPts val="2400"/>
-              <a:buFont typeface="Proxima Nova"/>
-              <a:buChar char="●"/>
-            </a:pPr>
-            <a:r>
-              <a:rPr lang="en" sz="2400">
-                <a:latin typeface="Proxima Nova"/>
-                <a:ea typeface="Proxima Nova"/>
-                <a:cs typeface="Proxima Nova"/>
-                <a:sym typeface="Proxima Nova"/>
-              </a:rPr>
-              <a:t>List Item 2</a:t>
-            </a:r>
-            <a:endParaRPr sz="2400">
-              <a:latin typeface="Proxima Nova"/>
-              <a:ea typeface="Proxima Nova"/>
-              <a:cs typeface="Proxima Nova"/>
-              <a:sym typeface="Proxima Nova"/>
-            </a:endParaRPr>
-          </a:p>
-          <a:p>
-            <a:pPr marL="0" lvl="0" indent="0" algn="l" rtl="0">
-              <a:spcBef>
-                <a:spcPts val="600"/>
-              </a:spcBef>
-              <a:spcAft>
-                <a:spcPts val="0"/>
-              </a:spcAft>
-              <a:buNone/>
-            </a:pPr>
-            <a:r>
-              <a:rPr lang="en" sz="2400" b="1">
-                <a:latin typeface="Proxima Nova"/>
-                <a:ea typeface="Proxima Nova"/>
-                <a:cs typeface="Proxima Nova"/>
-                <a:sym typeface="Proxima Nova"/>
-              </a:rPr>
-              <a:t>One more</a:t>
-            </a:r>
-            <a:endParaRPr sz="2400" b="1">
-              <a:latin typeface="Proxima Nova"/>
-              <a:ea typeface="Proxima Nova"/>
-              <a:cs typeface="Proxima Nova"/>
-              <a:sym typeface="Proxima Nova"/>
-            </a:endParaRPr>
-          </a:p>
-          <a:p>
-            <a:pPr marL="457200" lvl="0" indent="-381000" algn="l" rtl="0">
-              <a:spcBef>
-                <a:spcPts val="600"/>
-              </a:spcBef>
-              <a:spcAft>
-                <a:spcPts val="0"/>
-              </a:spcAft>
-              <a:buSzPts val="2400"/>
-              <a:buFont typeface="Proxima Nova"/>
-              <a:buChar char="●"/>
-            </a:pPr>
-            <a:r>
-              <a:rPr lang="en" sz="2400">
-                <a:latin typeface="Proxima Nova"/>
-                <a:ea typeface="Proxima Nova"/>
-                <a:cs typeface="Proxima Nova"/>
-                <a:sym typeface="Proxima Nova"/>
-              </a:rPr>
-              <a:t>List Item 1</a:t>
-            </a:r>
-            <a:endParaRPr sz="2400">
-              <a:latin typeface="Proxima Nova"/>
-              <a:ea typeface="Proxima Nova"/>
-              <a:cs typeface="Proxima Nova"/>
-              <a:sym typeface="Proxima Nova"/>
-            </a:endParaRPr>
-          </a:p>
-          <a:p>
-            <a:pPr marL="457200" lvl="0" indent="-381000" algn="l" rtl="0">
-              <a:spcBef>
-                <a:spcPts val="0"/>
-              </a:spcBef>
-              <a:spcAft>
-                <a:spcPts val="0"/>
-              </a:spcAft>
-              <a:buSzPts val="2400"/>
-              <a:buFont typeface="Proxima Nova"/>
-              <a:buChar char="●"/>
-            </a:pPr>
-            <a:r>
-              <a:rPr lang="en" sz="2400">
-                <a:latin typeface="Proxima Nova"/>
-                <a:ea typeface="Proxima Nova"/>
-                <a:cs typeface="Proxima Nova"/>
-                <a:sym typeface="Proxima Nova"/>
-              </a:rPr>
-              <a:t>List Item 2</a:t>
-            </a:r>
-            <a:endParaRPr sz="2400">
-              <a:latin typeface="Proxima Nova"/>
-              <a:ea typeface="Proxima Nova"/>
-              <a:cs typeface="Proxima Nova"/>
-              <a:sym typeface="Proxima Nova"/>
-            </a:endParaRPr>
-          </a:p>
-        </p:txBody>
-      </p:sp>
-    </p:spTree>
-  </p:cSld>
-  <p:clrMapOvr>
-    <a:masterClrMapping/>
-  </p:clrMapOvr>
-</p:sld>
-</file>
-
-<file path=ppt/slides/slide8.xml><?xml version="1.0" encoding="utf-8"?>
-<p:sld xmlns:a="http://schemas.openxmlformats.org/drawingml/2006/main" xmlns:r="http://schemas.openxmlformats.org/officeDocument/2006/relationships" xmlns:p="http://schemas.openxmlformats.org/presentationml/2006/main">
-  <p:cSld>
-    <p:bg>
-      <p:bgPr>
-        <a:solidFill>
-          <a:srgbClr val="1155CC"/>
-        </a:solidFill>
-        <a:effectLst/>
-      </p:bgPr>
-    </p:bg>
-    <p:spTree>
-      <p:nvGrpSpPr>
-        <p:cNvPr id="1" name="Shape 71"/>
-        <p:cNvGrpSpPr/>
-        <p:nvPr/>
-      </p:nvGrpSpPr>
-      <p:grpSpPr>
-        <a:xfrm>
-          <a:off x="0" y="0"/>
-          <a:ext cx="0" cy="0"/>
-          <a:chOff x="0" y="0"/>
-          <a:chExt cx="0" cy="0"/>
-        </a:xfrm>
-      </p:grpSpPr>
-      <p:sp>
-        <p:nvSpPr>
-          <p:cNvPr id="72" name="Google Shape;72;p14"/>
-          <p:cNvSpPr txBox="1">
-            <a:spLocks noGrp="1"/>
-          </p:cNvSpPr>
-          <p:nvPr>
-            <p:ph type="ctrTitle"/>
-          </p:nvPr>
-        </p:nvSpPr>
-        <p:spPr>
-          <a:xfrm>
-            <a:off x="685800" y="1583342"/>
-            <a:ext cx="7772400" cy="1159800"/>
-          </a:xfrm>
-          <a:prstGeom prst="rect">
-            <a:avLst/>
-          </a:prstGeom>
-        </p:spPr>
-        <p:txBody>
-          <a:bodyPr spcFirstLastPara="1" wrap="square" lIns="91425" tIns="91425" rIns="91425" bIns="91425" anchor="b" anchorCtr="0">
-            <a:noAutofit/>
-          </a:bodyPr>
-          <a:lstStyle/>
-          <a:p>
-            <a:pPr marL="0" lvl="0" indent="0" algn="l" rtl="0">
-              <a:spcBef>
-                <a:spcPts val="0"/>
-              </a:spcBef>
-              <a:spcAft>
-                <a:spcPts val="0"/>
-              </a:spcAft>
-              <a:buNone/>
-            </a:pPr>
-            <a:r>
-              <a:rPr lang="en">
-                <a:solidFill>
-                  <a:schemeClr val="lt1"/>
-                </a:solidFill>
-              </a:rPr>
-              <a:t>Inspired by Technology.</a:t>
-            </a:r>
-            <a:endParaRPr>
-              <a:solidFill>
-                <a:schemeClr val="lt1"/>
-              </a:solidFill>
-            </a:endParaRPr>
-          </a:p>
-          <a:p>
-            <a:pPr marL="0" lvl="0" indent="0" algn="l" rtl="0">
-              <a:spcBef>
-                <a:spcPts val="0"/>
-              </a:spcBef>
-              <a:spcAft>
-                <a:spcPts val="0"/>
-              </a:spcAft>
-              <a:buNone/>
-            </a:pPr>
-            <a:r>
-              <a:rPr lang="en">
-                <a:solidFill>
-                  <a:schemeClr val="lt1"/>
-                </a:solidFill>
-              </a:rPr>
-              <a:t>Driven by Value.</a:t>
-            </a:r>
-            <a:endParaRPr/>
-          </a:p>
-        </p:txBody>
-      </p:sp>
-      <p:sp>
-        <p:nvSpPr>
-          <p:cNvPr id="73" name="Google Shape;73;p14"/>
-          <p:cNvSpPr txBox="1">
-            <a:spLocks noGrp="1"/>
-          </p:cNvSpPr>
-          <p:nvPr>
-            <p:ph type="subTitle" idx="1"/>
-          </p:nvPr>
-        </p:nvSpPr>
-        <p:spPr>
-          <a:xfrm>
-            <a:off x="685800" y="2611454"/>
-            <a:ext cx="7772400" cy="784800"/>
-          </a:xfrm>
-          <a:prstGeom prst="rect">
-            <a:avLst/>
-          </a:prstGeom>
-        </p:spPr>
-        <p:txBody>
-          <a:bodyPr spcFirstLastPara="1" wrap="square" lIns="91425" tIns="91425" rIns="91425" bIns="91425" anchor="t" anchorCtr="0">
-            <a:noAutofit/>
-          </a:bodyPr>
-          <a:lstStyle/>
-          <a:p>
-            <a:pPr marL="0" lvl="0" indent="0" algn="l" rtl="0">
-              <a:spcBef>
-                <a:spcPts val="0"/>
-              </a:spcBef>
-              <a:spcAft>
-                <a:spcPts val="0"/>
-              </a:spcAft>
-              <a:buNone/>
-            </a:pPr>
-            <a:endParaRPr/>
-          </a:p>
-        </p:txBody>
-      </p:sp>
-      <p:pic>
-        <p:nvPicPr>
-          <p:cNvPr id="74" name="Google Shape;74;p14"/>
-          <p:cNvPicPr preferRelativeResize="0"/>
-          <p:nvPr/>
-        </p:nvPicPr>
-        <p:blipFill>
-          <a:blip r:embed="rId3">
-            <a:alphaModFix/>
-          </a:blip>
-          <a:stretch>
-            <a:fillRect/>
-          </a:stretch>
-        </p:blipFill>
-        <p:spPr>
-          <a:xfrm>
-            <a:off x="880225" y="676625"/>
-            <a:ext cx="828905" cy="227400"/>
-          </a:xfrm>
-          <a:prstGeom prst="rect">
-            <a:avLst/>
-          </a:prstGeom>
-          <a:noFill/>
-          <a:ln>
-            <a:noFill/>
-          </a:ln>
-        </p:spPr>
-      </p:pic>
     </p:spTree>
   </p:cSld>
   <p:clrMapOvr>

</xml_diff>